<commit_message>
Updating ppt and code
</commit_message>
<xml_diff>
--- a/AsyncCSharp50_SP.pptx
+++ b/AsyncCSharp50_SP.pptx
@@ -689,7 +689,7 @@
           <a:p>
             <a:fld id="{45720E3F-8D28-284B-8FA8-1F56EFCC2A55}" type="datetimeFigureOut">
               <a:rPr lang="en-US" smtClean="0"/>
-              <a:t>9/24/2013</a:t>
+              <a:t>10/8/2015</a:t>
             </a:fld>
             <a:endParaRPr lang="en-US" dirty="0"/>
           </a:p>
@@ -854,7 +854,7 @@
           <a:p>
             <a:fld id="{0C3534DE-0D6E-7F44-BDCB-A52509C287C5}" type="datetimeFigureOut">
               <a:rPr lang="en-US" smtClean="0"/>
-              <a:t>9/24/2013</a:t>
+              <a:t>10/8/2015</a:t>
             </a:fld>
             <a:endParaRPr lang="en-US" dirty="0"/>
           </a:p>
@@ -21374,7 +21374,11 @@
             </a:r>
             <a:r>
               <a:rPr lang="es-AR" dirty="0" smtClean="0"/>
-              <a:t> en C# 5.0</a:t>
+              <a:t> en C</a:t>
+            </a:r>
+            <a:r>
+              <a:rPr lang="es-AR" dirty="0" smtClean="0"/>
+              <a:t>#</a:t>
             </a:r>
             <a:endParaRPr lang="en-US" dirty="0"/>
           </a:p>
@@ -21396,12 +21400,8 @@
           <a:lstStyle/>
           <a:p>
             <a:r>
-              <a:rPr lang="en-US" dirty="0"/>
-              <a:t>tinyurl.com/</a:t>
-            </a:r>
-            <a:r>
-              <a:rPr lang="en-US" dirty="0" err="1"/>
-              <a:t>glasync</a:t>
+              <a:rPr lang="en-US" smtClean="0"/>
+              <a:t>http://tinyurl.com/glasync</a:t>
             </a:r>
             <a:endParaRPr lang="en-US" dirty="0"/>
           </a:p>

</xml_diff>